<commit_message>
Final br and poster
</commit_message>
<xml_diff>
--- a/Documents/ועדת מעבר.pptx
+++ b/Documents/ועדת מעבר.pptx
@@ -116,7 +116,7 @@
   </p:defaultTextStyle>
   <p:extLst>
     <p:ext uri="{EFAFB233-063F-42B5-8137-9DF3F51BA10A}">
-      <p15:sldGuideLst xmlns="" xmlns:p15="http://schemas.microsoft.com/office/powerpoint/2012/main">
+      <p15:sldGuideLst xmlns:p15="http://schemas.microsoft.com/office/powerpoint/2012/main">
         <p15:guide id="1" orient="horz" pos="2160">
           <p15:clr>
             <a:srgbClr val="A4A3A4"/>
@@ -216,7 +216,7 @@
             <a:fld id="{416AAA16-F7F4-4BB7-BC2D-56E3A3EFD626}" type="datetimeFigureOut">
               <a:rPr lang="he-IL" smtClean="0"/>
               <a:pPr/>
-              <a:t>י"ד/כסלו/תשע"ה</a:t>
+              <a:t>כ"א/כסלו/תשע"ה</a:t>
             </a:fld>
             <a:endParaRPr lang="he-IL"/>
           </a:p>
@@ -669,7 +669,7 @@
             <a:fld id="{0309AE4F-9C54-4FEE-ACEC-1FFC3EC84708}" type="datetimeFigureOut">
               <a:rPr lang="he-IL" smtClean="0"/>
               <a:pPr/>
-              <a:t>י"ד/כסלו/תשע"ה</a:t>
+              <a:t>כ"א/כסלו/תשע"ה</a:t>
             </a:fld>
             <a:endParaRPr lang="he-IL"/>
           </a:p>
@@ -846,7 +846,7 @@
             <a:fld id="{0309AE4F-9C54-4FEE-ACEC-1FFC3EC84708}" type="datetimeFigureOut">
               <a:rPr lang="he-IL" smtClean="0"/>
               <a:pPr/>
-              <a:t>י"ד/כסלו/תשע"ה</a:t>
+              <a:t>כ"א/כסלו/תשע"ה</a:t>
             </a:fld>
             <a:endParaRPr lang="he-IL"/>
           </a:p>
@@ -1023,7 +1023,7 @@
             <a:fld id="{0309AE4F-9C54-4FEE-ACEC-1FFC3EC84708}" type="datetimeFigureOut">
               <a:rPr lang="he-IL" smtClean="0"/>
               <a:pPr/>
-              <a:t>י"ד/כסלו/תשע"ה</a:t>
+              <a:t>כ"א/כסלו/תשע"ה</a:t>
             </a:fld>
             <a:endParaRPr lang="he-IL"/>
           </a:p>
@@ -1190,7 +1190,7 @@
             <a:fld id="{0309AE4F-9C54-4FEE-ACEC-1FFC3EC84708}" type="datetimeFigureOut">
               <a:rPr lang="he-IL" smtClean="0"/>
               <a:pPr/>
-              <a:t>י"ד/כסלו/תשע"ה</a:t>
+              <a:t>כ"א/כסלו/תשע"ה</a:t>
             </a:fld>
             <a:endParaRPr lang="he-IL"/>
           </a:p>
@@ -1433,7 +1433,7 @@
             <a:fld id="{0309AE4F-9C54-4FEE-ACEC-1FFC3EC84708}" type="datetimeFigureOut">
               <a:rPr lang="he-IL" smtClean="0"/>
               <a:pPr/>
-              <a:t>י"ד/כסלו/תשע"ה</a:t>
+              <a:t>כ"א/כסלו/תשע"ה</a:t>
             </a:fld>
             <a:endParaRPr lang="he-IL"/>
           </a:p>
@@ -1718,7 +1718,7 @@
             <a:fld id="{0309AE4F-9C54-4FEE-ACEC-1FFC3EC84708}" type="datetimeFigureOut">
               <a:rPr lang="he-IL" smtClean="0"/>
               <a:pPr/>
-              <a:t>י"ד/כסלו/תשע"ה</a:t>
+              <a:t>כ"א/כסלו/תשע"ה</a:t>
             </a:fld>
             <a:endParaRPr lang="he-IL"/>
           </a:p>
@@ -2137,7 +2137,7 @@
             <a:fld id="{0309AE4F-9C54-4FEE-ACEC-1FFC3EC84708}" type="datetimeFigureOut">
               <a:rPr lang="he-IL" smtClean="0"/>
               <a:pPr/>
-              <a:t>י"ד/כסלו/תשע"ה</a:t>
+              <a:t>כ"א/כסלו/תשע"ה</a:t>
             </a:fld>
             <a:endParaRPr lang="he-IL"/>
           </a:p>
@@ -2252,7 +2252,7 @@
             <a:fld id="{0309AE4F-9C54-4FEE-ACEC-1FFC3EC84708}" type="datetimeFigureOut">
               <a:rPr lang="he-IL" smtClean="0"/>
               <a:pPr/>
-              <a:t>י"ד/כסלו/תשע"ה</a:t>
+              <a:t>כ"א/כסלו/תשע"ה</a:t>
             </a:fld>
             <a:endParaRPr lang="he-IL"/>
           </a:p>
@@ -2344,7 +2344,7 @@
             <a:fld id="{0309AE4F-9C54-4FEE-ACEC-1FFC3EC84708}" type="datetimeFigureOut">
               <a:rPr lang="he-IL" smtClean="0"/>
               <a:pPr/>
-              <a:t>י"ד/כסלו/תשע"ה</a:t>
+              <a:t>כ"א/כסלו/תשע"ה</a:t>
             </a:fld>
             <a:endParaRPr lang="he-IL"/>
           </a:p>
@@ -2618,7 +2618,7 @@
             <a:fld id="{0309AE4F-9C54-4FEE-ACEC-1FFC3EC84708}" type="datetimeFigureOut">
               <a:rPr lang="he-IL" smtClean="0"/>
               <a:pPr/>
-              <a:t>י"ד/כסלו/תשע"ה</a:t>
+              <a:t>כ"א/כסלו/תשע"ה</a:t>
             </a:fld>
             <a:endParaRPr lang="he-IL"/>
           </a:p>
@@ -2868,7 +2868,7 @@
             <a:fld id="{0309AE4F-9C54-4FEE-ACEC-1FFC3EC84708}" type="datetimeFigureOut">
               <a:rPr lang="he-IL" smtClean="0"/>
               <a:pPr/>
-              <a:t>י"ד/כסלו/תשע"ה</a:t>
+              <a:t>כ"א/כסלו/תשע"ה</a:t>
             </a:fld>
             <a:endParaRPr lang="he-IL"/>
           </a:p>
@@ -3699,11 +3699,7 @@
             </a:pPr>
             <a:r>
               <a:rPr lang="he-IL" dirty="0" smtClean="0"/>
-              <a:t>נטע לי </a:t>
-            </a:r>
-            <a:r>
-              <a:rPr lang="he-IL" dirty="0" smtClean="0"/>
-              <a:t>להט</a:t>
+              <a:t>נטע לי להט</a:t>
             </a:r>
           </a:p>
           <a:p>
@@ -4170,16 +4166,9 @@
             </a:pPr>
             <a:r>
               <a:rPr lang="he-IL" dirty="0" smtClean="0"/>
-              <a:t>כתיבת </a:t>
-            </a:r>
-            <a:r>
-              <a:rPr lang="en-US" dirty="0" smtClean="0"/>
-              <a:t>Crawler</a:t>
-            </a:r>
-            <a:r>
-              <a:rPr lang="he-IL" dirty="0" smtClean="0"/>
-              <a:t> לאיסוף המידע מהרשת.</a:t>
-            </a:r>
+              <a:t>בחירת אלגוריתם לכריית נתונים, לצורך ניתוח נתונים והסקת מסקנות.</a:t>
+            </a:r>
+            <a:endParaRPr lang="he-IL" dirty="0" smtClean="0"/>
           </a:p>
           <a:p>
             <a:pPr lvl="1">
@@ -4192,43 +4181,11 @@
             </a:r>
             <a:r>
               <a:rPr lang="he-IL" dirty="0" smtClean="0"/>
-              <a:t>אחסון המידע במסדי נתונים רחבי היקף.</a:t>
-            </a:r>
-          </a:p>
-          <a:p>
-            <a:pPr lvl="1">
-              <a:buFont typeface="Wingdings" pitchFamily="2" charset="2"/>
-              <a:buChar char="q"/>
-            </a:pPr>
-            <a:r>
-              <a:rPr lang="he-IL" dirty="0"/>
-              <a:t> </a:t>
-            </a:r>
-            <a:r>
-              <a:rPr lang="he-IL" dirty="0" smtClean="0"/>
-              <a:t>כריית נתונים להסקת תובנות.</a:t>
-            </a:r>
-          </a:p>
-          <a:p>
-            <a:pPr lvl="1">
-              <a:buFont typeface="Wingdings" pitchFamily="2" charset="2"/>
-              <a:buChar char="q"/>
-            </a:pPr>
-            <a:r>
-              <a:rPr lang="he-IL" dirty="0"/>
-              <a:t> </a:t>
-            </a:r>
-            <a:r>
-              <a:rPr lang="he-IL" dirty="0" smtClean="0"/>
-              <a:t>שימוש בטכנולוגיות </a:t>
-            </a:r>
-            <a:r>
-              <a:rPr lang="en-US" dirty="0" smtClean="0"/>
-              <a:t>Web</a:t>
-            </a:r>
-            <a:r>
-              <a:rPr lang="he-IL" dirty="0" smtClean="0"/>
-              <a:t> עבור שכבת הפרזנטציה.</a:t>
+              <a:t>שימוש </a:t>
+            </a:r>
+            <a:r>
+              <a:rPr lang="he-IL" smtClean="0"/>
+              <a:t>בסטטיסטיקה והסתברות.</a:t>
             </a:r>
             <a:endParaRPr lang="he-IL" dirty="0"/>
           </a:p>
@@ -4351,7 +4308,6 @@
               <a:rPr lang="he-IL" dirty="0" smtClean="0"/>
               <a:t>אבני הדרך:</a:t>
             </a:r>
-            <a:endParaRPr lang="he-IL" dirty="0" smtClean="0"/>
           </a:p>
           <a:p>
             <a:pPr lvl="2">
@@ -4374,11 +4330,7 @@
             </a:r>
             <a:r>
               <a:rPr lang="he-IL" dirty="0" smtClean="0"/>
-              <a:t> ל</a:t>
-            </a:r>
-            <a:r>
-              <a:rPr lang="he-IL" dirty="0" smtClean="0"/>
-              <a:t>בחירת טכנולוגיה ל</a:t>
+              <a:t> לבחירת טכנולוגיה ל</a:t>
             </a:r>
             <a:r>
               <a:rPr lang="en-US" dirty="0" smtClean="0"/>
@@ -4654,11 +4606,7 @@
             </a:pPr>
             <a:r>
               <a:rPr lang="he-IL" dirty="0" smtClean="0"/>
-              <a:t> </a:t>
-            </a:r>
-            <a:r>
-              <a:rPr lang="he-IL" dirty="0" smtClean="0"/>
-              <a:t>שרת (וירטואלי) עם אחסון רב ככל הניתן ו</a:t>
+              <a:t> שרת (וירטואלי) עם אחסון רב ככל הניתן ו</a:t>
             </a:r>
             <a:r>
               <a:rPr lang="en-US" dirty="0" smtClean="0"/>

</xml_diff>